<commit_message>
cfast tg: update radiation section - configuration factors, solid angles
</commit_message>
<xml_diff>
--- a/Docs/Tech_Ref/FIGURES/configfactorsetup.pptx
+++ b/Docs/Tech_Ref/FIGURES/configfactorsetup.pptx
@@ -6,9 +6,10 @@
   </p:sldMasterIdLst>
   <p:sldIdLst>
     <p:sldId id="256" r:id="rId2"/>
+    <p:sldId id="257" r:id="rId3"/>
   </p:sldIdLst>
   <p:sldSz cx="12192000" cy="6858000"/>
-  <p:notesSz cx="6858000" cy="9144000"/>
+  <p:notesSz cx="7315200" cy="9601200"/>
   <p:defaultTextStyle>
     <a:defPPr>
       <a:defRPr lang="en-US"/>
@@ -3304,6 +3305,401 @@
   <p:clrMapOvr>
     <a:masterClrMapping/>
   </p:clrMapOvr>
+  <p:timing>
+    <p:tnLst>
+      <p:par>
+        <p:cTn id="1" dur="indefinite" restart="never" nodeType="tmRoot"/>
+      </p:par>
+    </p:tnLst>
+  </p:timing>
+</p:sld>
+</file>
+
+<file path=ppt/slides/slide2.xml><?xml version="1.0" encoding="utf-8"?>
+<p:sld xmlns:a="http://schemas.openxmlformats.org/drawingml/2006/main" xmlns:r="http://schemas.openxmlformats.org/officeDocument/2006/relationships" xmlns:p="http://schemas.openxmlformats.org/presentationml/2006/main">
+  <p:cSld>
+    <p:spTree>
+      <p:nvGrpSpPr>
+        <p:cNvPr id="1" name=""/>
+        <p:cNvGrpSpPr/>
+        <p:nvPr/>
+      </p:nvGrpSpPr>
+      <p:grpSpPr>
+        <a:xfrm>
+          <a:off x="0" y="0"/>
+          <a:ext cx="0" cy="0"/>
+          <a:chOff x="0" y="0"/>
+          <a:chExt cx="0" cy="0"/>
+        </a:xfrm>
+      </p:grpSpPr>
+      <p:cxnSp>
+        <p:nvCxnSpPr>
+          <p:cNvPr id="3" name="Straight Connector 2"/>
+          <p:cNvCxnSpPr/>
+          <p:nvPr/>
+        </p:nvCxnSpPr>
+        <p:spPr>
+          <a:xfrm>
+            <a:off x="7280584" y="585216"/>
+            <a:ext cx="1975104" cy="2834640"/>
+          </a:xfrm>
+          <a:prstGeom prst="line">
+            <a:avLst/>
+          </a:prstGeom>
+          <a:ln w="38100">
+            <a:solidFill>
+              <a:schemeClr val="tx1"/>
+            </a:solidFill>
+          </a:ln>
+        </p:spPr>
+        <p:style>
+          <a:lnRef idx="1">
+            <a:schemeClr val="accent1"/>
+          </a:lnRef>
+          <a:fillRef idx="0">
+            <a:schemeClr val="accent1"/>
+          </a:fillRef>
+          <a:effectRef idx="0">
+            <a:schemeClr val="accent1"/>
+          </a:effectRef>
+          <a:fontRef idx="minor">
+            <a:schemeClr val="tx1"/>
+          </a:fontRef>
+        </p:style>
+      </p:cxnSp>
+      <p:cxnSp>
+        <p:nvCxnSpPr>
+          <p:cNvPr id="8" name="Straight Connector 7"/>
+          <p:cNvCxnSpPr/>
+          <p:nvPr/>
+        </p:nvCxnSpPr>
+        <p:spPr>
+          <a:xfrm flipH="1">
+            <a:off x="5431536" y="585216"/>
+            <a:ext cx="1865376" cy="1417320"/>
+          </a:xfrm>
+          <a:prstGeom prst="line">
+            <a:avLst/>
+          </a:prstGeom>
+          <a:ln w="38100">
+            <a:solidFill>
+              <a:schemeClr val="tx1"/>
+            </a:solidFill>
+          </a:ln>
+        </p:spPr>
+        <p:style>
+          <a:lnRef idx="1">
+            <a:schemeClr val="accent1"/>
+          </a:lnRef>
+          <a:fillRef idx="0">
+            <a:schemeClr val="accent1"/>
+          </a:fillRef>
+          <a:effectRef idx="0">
+            <a:schemeClr val="accent1"/>
+          </a:effectRef>
+          <a:fontRef idx="minor">
+            <a:schemeClr val="tx1"/>
+          </a:fontRef>
+        </p:style>
+      </p:cxnSp>
+      <p:cxnSp>
+        <p:nvCxnSpPr>
+          <p:cNvPr id="17" name="Straight Connector 16"/>
+          <p:cNvCxnSpPr/>
+          <p:nvPr/>
+        </p:nvCxnSpPr>
+        <p:spPr>
+          <a:xfrm>
+            <a:off x="5423372" y="1994372"/>
+            <a:ext cx="3840480" cy="1417320"/>
+          </a:xfrm>
+          <a:prstGeom prst="line">
+            <a:avLst/>
+          </a:prstGeom>
+          <a:ln w="38100">
+            <a:solidFill>
+              <a:schemeClr val="tx1"/>
+            </a:solidFill>
+          </a:ln>
+        </p:spPr>
+        <p:style>
+          <a:lnRef idx="1">
+            <a:schemeClr val="accent1"/>
+          </a:lnRef>
+          <a:fillRef idx="0">
+            <a:schemeClr val="accent1"/>
+          </a:fillRef>
+          <a:effectRef idx="0">
+            <a:schemeClr val="accent1"/>
+          </a:effectRef>
+          <a:fontRef idx="minor">
+            <a:schemeClr val="tx1"/>
+          </a:fontRef>
+        </p:style>
+      </p:cxnSp>
+      <p:cxnSp>
+        <p:nvCxnSpPr>
+          <p:cNvPr id="21" name="Straight Arrow Connector 20"/>
+          <p:cNvCxnSpPr/>
+          <p:nvPr/>
+        </p:nvCxnSpPr>
+        <p:spPr>
+          <a:xfrm flipV="1">
+            <a:off x="4901184" y="2002536"/>
+            <a:ext cx="530352" cy="3575304"/>
+          </a:xfrm>
+          <a:prstGeom prst="straightConnector1">
+            <a:avLst/>
+          </a:prstGeom>
+          <a:ln w="38100">
+            <a:solidFill>
+              <a:schemeClr val="tx1"/>
+            </a:solidFill>
+            <a:tailEnd type="arrow"/>
+          </a:ln>
+        </p:spPr>
+        <p:style>
+          <a:lnRef idx="1">
+            <a:schemeClr val="accent1"/>
+          </a:lnRef>
+          <a:fillRef idx="0">
+            <a:schemeClr val="accent1"/>
+          </a:fillRef>
+          <a:effectRef idx="0">
+            <a:schemeClr val="accent1"/>
+          </a:effectRef>
+          <a:fontRef idx="minor">
+            <a:schemeClr val="tx1"/>
+          </a:fontRef>
+        </p:style>
+      </p:cxnSp>
+      <p:cxnSp>
+        <p:nvCxnSpPr>
+          <p:cNvPr id="23" name="Straight Arrow Connector 22"/>
+          <p:cNvCxnSpPr/>
+          <p:nvPr/>
+        </p:nvCxnSpPr>
+        <p:spPr>
+          <a:xfrm flipV="1">
+            <a:off x="4901184" y="585216"/>
+            <a:ext cx="2395728" cy="4992624"/>
+          </a:xfrm>
+          <a:prstGeom prst="straightConnector1">
+            <a:avLst/>
+          </a:prstGeom>
+          <a:ln w="38100">
+            <a:solidFill>
+              <a:schemeClr val="tx1"/>
+            </a:solidFill>
+            <a:tailEnd type="arrow"/>
+          </a:ln>
+        </p:spPr>
+        <p:style>
+          <a:lnRef idx="1">
+            <a:schemeClr val="accent1"/>
+          </a:lnRef>
+          <a:fillRef idx="0">
+            <a:schemeClr val="accent1"/>
+          </a:fillRef>
+          <a:effectRef idx="0">
+            <a:schemeClr val="accent1"/>
+          </a:effectRef>
+          <a:fontRef idx="minor">
+            <a:schemeClr val="tx1"/>
+          </a:fontRef>
+        </p:style>
+      </p:cxnSp>
+      <p:cxnSp>
+        <p:nvCxnSpPr>
+          <p:cNvPr id="25" name="Straight Arrow Connector 24"/>
+          <p:cNvCxnSpPr/>
+          <p:nvPr/>
+        </p:nvCxnSpPr>
+        <p:spPr>
+          <a:xfrm flipV="1">
+            <a:off x="4901184" y="3419856"/>
+            <a:ext cx="4370832" cy="2157984"/>
+          </a:xfrm>
+          <a:prstGeom prst="straightConnector1">
+            <a:avLst/>
+          </a:prstGeom>
+          <a:ln w="38100">
+            <a:solidFill>
+              <a:schemeClr val="tx1"/>
+            </a:solidFill>
+            <a:tailEnd type="arrow"/>
+          </a:ln>
+        </p:spPr>
+        <p:style>
+          <a:lnRef idx="1">
+            <a:schemeClr val="accent1"/>
+          </a:lnRef>
+          <a:fillRef idx="0">
+            <a:schemeClr val="accent1"/>
+          </a:fillRef>
+          <a:effectRef idx="0">
+            <a:schemeClr val="accent1"/>
+          </a:effectRef>
+          <a:fontRef idx="minor">
+            <a:schemeClr val="tx1"/>
+          </a:fontRef>
+        </p:style>
+      </p:cxnSp>
+      <p:sp>
+        <p:nvSpPr>
+          <p:cNvPr id="26" name="Oval 25"/>
+          <p:cNvSpPr/>
+          <p:nvPr/>
+        </p:nvSpPr>
+        <p:spPr>
+          <a:xfrm>
+            <a:off x="4828032" y="5431536"/>
+            <a:ext cx="182880" cy="182880"/>
+          </a:xfrm>
+          <a:prstGeom prst="ellipse">
+            <a:avLst/>
+          </a:prstGeom>
+          <a:solidFill>
+            <a:schemeClr val="tx1"/>
+          </a:solidFill>
+          <a:ln>
+            <a:solidFill>
+              <a:schemeClr val="tx1"/>
+            </a:solidFill>
+          </a:ln>
+        </p:spPr>
+        <p:style>
+          <a:lnRef idx="2">
+            <a:schemeClr val="accent1">
+              <a:shade val="50000"/>
+            </a:schemeClr>
+          </a:lnRef>
+          <a:fillRef idx="1">
+            <a:schemeClr val="accent1"/>
+          </a:fillRef>
+          <a:effectRef idx="0">
+            <a:schemeClr val="accent1"/>
+          </a:effectRef>
+          <a:fontRef idx="minor">
+            <a:schemeClr val="lt1"/>
+          </a:fontRef>
+        </p:style>
+        <p:txBody>
+          <a:bodyPr rtlCol="0" anchor="ctr"/>
+          <a:lstStyle/>
+          <a:p>
+            <a:pPr algn="ctr"/>
+            <a:endParaRPr lang="en-US"/>
+          </a:p>
+        </p:txBody>
+      </p:sp>
+      <p:sp>
+        <p:nvSpPr>
+          <p:cNvPr id="27" name="TextBox 26"/>
+          <p:cNvSpPr txBox="1"/>
+          <p:nvPr/>
+        </p:nvSpPr>
+        <p:spPr>
+          <a:xfrm>
+            <a:off x="4611466" y="3050524"/>
+            <a:ext cx="433132" cy="369332"/>
+          </a:xfrm>
+          <a:prstGeom prst="rect">
+            <a:avLst/>
+          </a:prstGeom>
+          <a:noFill/>
+        </p:spPr>
+        <p:txBody>
+          <a:bodyPr wrap="none" rtlCol="0">
+            <a:spAutoFit/>
+          </a:bodyPr>
+          <a:lstStyle/>
+          <a:p>
+            <a:r>
+              <a:rPr lang="en-US" dirty="0" smtClean="0"/>
+              <a:t>V1</a:t>
+            </a:r>
+            <a:endParaRPr lang="en-US" dirty="0"/>
+          </a:p>
+        </p:txBody>
+      </p:sp>
+      <p:sp>
+        <p:nvSpPr>
+          <p:cNvPr id="28" name="TextBox 27"/>
+          <p:cNvSpPr txBox="1"/>
+          <p:nvPr/>
+        </p:nvSpPr>
+        <p:spPr>
+          <a:xfrm>
+            <a:off x="6845492" y="1633204"/>
+            <a:ext cx="433132" cy="369332"/>
+          </a:xfrm>
+          <a:prstGeom prst="rect">
+            <a:avLst/>
+          </a:prstGeom>
+          <a:noFill/>
+        </p:spPr>
+        <p:txBody>
+          <a:bodyPr wrap="none" rtlCol="0">
+            <a:spAutoFit/>
+          </a:bodyPr>
+          <a:lstStyle/>
+          <a:p>
+            <a:r>
+              <a:rPr lang="en-US" dirty="0" smtClean="0"/>
+              <a:t>V2</a:t>
+            </a:r>
+            <a:endParaRPr lang="en-US" dirty="0"/>
+          </a:p>
+        </p:txBody>
+      </p:sp>
+      <p:sp>
+        <p:nvSpPr>
+          <p:cNvPr id="29" name="TextBox 28"/>
+          <p:cNvSpPr txBox="1"/>
+          <p:nvPr/>
+        </p:nvSpPr>
+        <p:spPr>
+          <a:xfrm>
+            <a:off x="8665306" y="3941278"/>
+            <a:ext cx="433132" cy="369332"/>
+          </a:xfrm>
+          <a:prstGeom prst="rect">
+            <a:avLst/>
+          </a:prstGeom>
+          <a:noFill/>
+        </p:spPr>
+        <p:txBody>
+          <a:bodyPr wrap="none" rtlCol="0">
+            <a:spAutoFit/>
+          </a:bodyPr>
+          <a:lstStyle/>
+          <a:p>
+            <a:r>
+              <a:rPr lang="en-US" dirty="0" smtClean="0"/>
+              <a:t>V3</a:t>
+            </a:r>
+            <a:endParaRPr lang="en-US" dirty="0"/>
+          </a:p>
+        </p:txBody>
+      </p:sp>
+    </p:spTree>
+    <p:extLst>
+      <p:ext uri="{BB962C8B-B14F-4D97-AF65-F5344CB8AC3E}">
+        <p14:creationId xmlns:p14="http://schemas.microsoft.com/office/powerpoint/2010/main" val="1135426529"/>
+      </p:ext>
+    </p:extLst>
+  </p:cSld>
+  <p:clrMapOvr>
+    <a:masterClrMapping/>
+  </p:clrMapOvr>
+  <p:timing>
+    <p:tnLst>
+      <p:par>
+        <p:cTn id="1" dur="indefinite" restart="never" nodeType="tmRoot"/>
+      </p:par>
+    </p:tnLst>
+  </p:timing>
 </p:sld>
 </file>
 
@@ -3562,7 +3958,7 @@
   <a:extraClrSchemeLst/>
   <a:extLst>
     <a:ext uri="{05A4C25C-085E-4340-85A3-A5531E510DB2}">
-      <thm15:themeFamily xmlns:thm15="http://schemas.microsoft.com/office/thememl/2012/main" name="Office Theme" id="{62F939B6-93AF-4DB8-9C6B-D6C7DFDC589F}" vid="{4A3C46E8-61CC-4603-A589-7422A47A8E4A}"/>
+      <thm15:themeFamily xmlns:thm15="http://schemas.microsoft.com/office/thememl/2012/main" xmlns="" name="Office Theme" id="{62F939B6-93AF-4DB8-9C6B-D6C7DFDC589F}" vid="{4A3C46E8-61CC-4603-A589-7422A47A8E4A}"/>
     </a:ext>
   </a:extLst>
 </a:theme>

</xml_diff>

<commit_message>
cfast tg: update radiation figures
</commit_message>
<xml_diff>
--- a/Docs/Tech_Ref/FIGURES/configfactorsetup.pptx
+++ b/Docs/Tech_Ref/FIGURES/configfactorsetup.pptx
@@ -6,7 +6,6 @@
   </p:sldMasterIdLst>
   <p:sldIdLst>
     <p:sldId id="256" r:id="rId2"/>
-    <p:sldId id="257" r:id="rId3"/>
   </p:sldIdLst>
   <p:sldSz cx="12192000" cy="6858000"/>
   <p:notesSz cx="7315200" cy="9601200"/>
@@ -239,7 +238,7 @@
           <a:p>
             <a:fld id="{DB1A0588-BD2B-4491-BED8-3F7A36165C09}" type="datetimeFigureOut">
               <a:rPr lang="en-US" smtClean="0"/>
-              <a:t>8/3/2015</a:t>
+              <a:t>8/7/2015</a:t>
             </a:fld>
             <a:endParaRPr lang="en-US"/>
           </a:p>
@@ -409,7 +408,7 @@
           <a:p>
             <a:fld id="{DB1A0588-BD2B-4491-BED8-3F7A36165C09}" type="datetimeFigureOut">
               <a:rPr lang="en-US" smtClean="0"/>
-              <a:t>8/3/2015</a:t>
+              <a:t>8/7/2015</a:t>
             </a:fld>
             <a:endParaRPr lang="en-US"/>
           </a:p>
@@ -589,7 +588,7 @@
           <a:p>
             <a:fld id="{DB1A0588-BD2B-4491-BED8-3F7A36165C09}" type="datetimeFigureOut">
               <a:rPr lang="en-US" smtClean="0"/>
-              <a:t>8/3/2015</a:t>
+              <a:t>8/7/2015</a:t>
             </a:fld>
             <a:endParaRPr lang="en-US"/>
           </a:p>
@@ -759,7 +758,7 @@
           <a:p>
             <a:fld id="{DB1A0588-BD2B-4491-BED8-3F7A36165C09}" type="datetimeFigureOut">
               <a:rPr lang="en-US" smtClean="0"/>
-              <a:t>8/3/2015</a:t>
+              <a:t>8/7/2015</a:t>
             </a:fld>
             <a:endParaRPr lang="en-US"/>
           </a:p>
@@ -1005,7 +1004,7 @@
           <a:p>
             <a:fld id="{DB1A0588-BD2B-4491-BED8-3F7A36165C09}" type="datetimeFigureOut">
               <a:rPr lang="en-US" smtClean="0"/>
-              <a:t>8/3/2015</a:t>
+              <a:t>8/7/2015</a:t>
             </a:fld>
             <a:endParaRPr lang="en-US"/>
           </a:p>
@@ -1237,7 +1236,7 @@
           <a:p>
             <a:fld id="{DB1A0588-BD2B-4491-BED8-3F7A36165C09}" type="datetimeFigureOut">
               <a:rPr lang="en-US" smtClean="0"/>
-              <a:t>8/3/2015</a:t>
+              <a:t>8/7/2015</a:t>
             </a:fld>
             <a:endParaRPr lang="en-US"/>
           </a:p>
@@ -1604,7 +1603,7 @@
           <a:p>
             <a:fld id="{DB1A0588-BD2B-4491-BED8-3F7A36165C09}" type="datetimeFigureOut">
               <a:rPr lang="en-US" smtClean="0"/>
-              <a:t>8/3/2015</a:t>
+              <a:t>8/7/2015</a:t>
             </a:fld>
             <a:endParaRPr lang="en-US"/>
           </a:p>
@@ -1722,7 +1721,7 @@
           <a:p>
             <a:fld id="{DB1A0588-BD2B-4491-BED8-3F7A36165C09}" type="datetimeFigureOut">
               <a:rPr lang="en-US" smtClean="0"/>
-              <a:t>8/3/2015</a:t>
+              <a:t>8/7/2015</a:t>
             </a:fld>
             <a:endParaRPr lang="en-US"/>
           </a:p>
@@ -1817,7 +1816,7 @@
           <a:p>
             <a:fld id="{DB1A0588-BD2B-4491-BED8-3F7A36165C09}" type="datetimeFigureOut">
               <a:rPr lang="en-US" smtClean="0"/>
-              <a:t>8/3/2015</a:t>
+              <a:t>8/7/2015</a:t>
             </a:fld>
             <a:endParaRPr lang="en-US"/>
           </a:p>
@@ -2094,7 +2093,7 @@
           <a:p>
             <a:fld id="{DB1A0588-BD2B-4491-BED8-3F7A36165C09}" type="datetimeFigureOut">
               <a:rPr lang="en-US" smtClean="0"/>
-              <a:t>8/3/2015</a:t>
+              <a:t>8/7/2015</a:t>
             </a:fld>
             <a:endParaRPr lang="en-US"/>
           </a:p>
@@ -2347,7 +2346,7 @@
           <a:p>
             <a:fld id="{DB1A0588-BD2B-4491-BED8-3F7A36165C09}" type="datetimeFigureOut">
               <a:rPr lang="en-US" smtClean="0"/>
-              <a:t>8/3/2015</a:t>
+              <a:t>8/7/2015</a:t>
             </a:fld>
             <a:endParaRPr lang="en-US"/>
           </a:p>
@@ -2560,7 +2559,7 @@
           <a:p>
             <a:fld id="{DB1A0588-BD2B-4491-BED8-3F7A36165C09}" type="datetimeFigureOut">
               <a:rPr lang="en-US" smtClean="0"/>
-              <a:t>8/3/2015</a:t>
+              <a:t>8/7/2015</a:t>
             </a:fld>
             <a:endParaRPr lang="en-US"/>
           </a:p>
@@ -2973,7 +2972,7 @@
         </p:nvCxnSpPr>
         <p:spPr>
           <a:xfrm>
-            <a:off x="4066391" y="1678193"/>
+            <a:off x="4066391" y="1694521"/>
             <a:ext cx="4572000" cy="0"/>
           </a:xfrm>
           <a:prstGeom prst="line">
@@ -3044,7 +3043,7 @@
         </p:nvCxnSpPr>
         <p:spPr>
           <a:xfrm>
-            <a:off x="4066391" y="4244788"/>
+            <a:off x="4066391" y="4236624"/>
             <a:ext cx="4572000" cy="0"/>
           </a:xfrm>
           <a:prstGeom prst="line">
@@ -3299,394 +3298,6 @@
     <p:extLst>
       <p:ext uri="{BB962C8B-B14F-4D97-AF65-F5344CB8AC3E}">
         <p14:creationId xmlns:p14="http://schemas.microsoft.com/office/powerpoint/2010/main" val="195632379"/>
-      </p:ext>
-    </p:extLst>
-  </p:cSld>
-  <p:clrMapOvr>
-    <a:masterClrMapping/>
-  </p:clrMapOvr>
-  <p:timing>
-    <p:tnLst>
-      <p:par>
-        <p:cTn id="1" dur="indefinite" restart="never" nodeType="tmRoot"/>
-      </p:par>
-    </p:tnLst>
-  </p:timing>
-</p:sld>
-</file>
-
-<file path=ppt/slides/slide2.xml><?xml version="1.0" encoding="utf-8"?>
-<p:sld xmlns:a="http://schemas.openxmlformats.org/drawingml/2006/main" xmlns:r="http://schemas.openxmlformats.org/officeDocument/2006/relationships" xmlns:p="http://schemas.openxmlformats.org/presentationml/2006/main">
-  <p:cSld>
-    <p:spTree>
-      <p:nvGrpSpPr>
-        <p:cNvPr id="1" name=""/>
-        <p:cNvGrpSpPr/>
-        <p:nvPr/>
-      </p:nvGrpSpPr>
-      <p:grpSpPr>
-        <a:xfrm>
-          <a:off x="0" y="0"/>
-          <a:ext cx="0" cy="0"/>
-          <a:chOff x="0" y="0"/>
-          <a:chExt cx="0" cy="0"/>
-        </a:xfrm>
-      </p:grpSpPr>
-      <p:cxnSp>
-        <p:nvCxnSpPr>
-          <p:cNvPr id="3" name="Straight Connector 2"/>
-          <p:cNvCxnSpPr/>
-          <p:nvPr/>
-        </p:nvCxnSpPr>
-        <p:spPr>
-          <a:xfrm>
-            <a:off x="7280584" y="585216"/>
-            <a:ext cx="1975104" cy="2834640"/>
-          </a:xfrm>
-          <a:prstGeom prst="line">
-            <a:avLst/>
-          </a:prstGeom>
-          <a:ln w="38100">
-            <a:solidFill>
-              <a:schemeClr val="tx1"/>
-            </a:solidFill>
-          </a:ln>
-        </p:spPr>
-        <p:style>
-          <a:lnRef idx="1">
-            <a:schemeClr val="accent1"/>
-          </a:lnRef>
-          <a:fillRef idx="0">
-            <a:schemeClr val="accent1"/>
-          </a:fillRef>
-          <a:effectRef idx="0">
-            <a:schemeClr val="accent1"/>
-          </a:effectRef>
-          <a:fontRef idx="minor">
-            <a:schemeClr val="tx1"/>
-          </a:fontRef>
-        </p:style>
-      </p:cxnSp>
-      <p:cxnSp>
-        <p:nvCxnSpPr>
-          <p:cNvPr id="8" name="Straight Connector 7"/>
-          <p:cNvCxnSpPr/>
-          <p:nvPr/>
-        </p:nvCxnSpPr>
-        <p:spPr>
-          <a:xfrm flipH="1">
-            <a:off x="5431536" y="585216"/>
-            <a:ext cx="1865376" cy="1417320"/>
-          </a:xfrm>
-          <a:prstGeom prst="line">
-            <a:avLst/>
-          </a:prstGeom>
-          <a:ln w="38100">
-            <a:solidFill>
-              <a:schemeClr val="tx1"/>
-            </a:solidFill>
-          </a:ln>
-        </p:spPr>
-        <p:style>
-          <a:lnRef idx="1">
-            <a:schemeClr val="accent1"/>
-          </a:lnRef>
-          <a:fillRef idx="0">
-            <a:schemeClr val="accent1"/>
-          </a:fillRef>
-          <a:effectRef idx="0">
-            <a:schemeClr val="accent1"/>
-          </a:effectRef>
-          <a:fontRef idx="minor">
-            <a:schemeClr val="tx1"/>
-          </a:fontRef>
-        </p:style>
-      </p:cxnSp>
-      <p:cxnSp>
-        <p:nvCxnSpPr>
-          <p:cNvPr id="17" name="Straight Connector 16"/>
-          <p:cNvCxnSpPr/>
-          <p:nvPr/>
-        </p:nvCxnSpPr>
-        <p:spPr>
-          <a:xfrm>
-            <a:off x="5423372" y="1994372"/>
-            <a:ext cx="3840480" cy="1417320"/>
-          </a:xfrm>
-          <a:prstGeom prst="line">
-            <a:avLst/>
-          </a:prstGeom>
-          <a:ln w="38100">
-            <a:solidFill>
-              <a:schemeClr val="tx1"/>
-            </a:solidFill>
-          </a:ln>
-        </p:spPr>
-        <p:style>
-          <a:lnRef idx="1">
-            <a:schemeClr val="accent1"/>
-          </a:lnRef>
-          <a:fillRef idx="0">
-            <a:schemeClr val="accent1"/>
-          </a:fillRef>
-          <a:effectRef idx="0">
-            <a:schemeClr val="accent1"/>
-          </a:effectRef>
-          <a:fontRef idx="minor">
-            <a:schemeClr val="tx1"/>
-          </a:fontRef>
-        </p:style>
-      </p:cxnSp>
-      <p:cxnSp>
-        <p:nvCxnSpPr>
-          <p:cNvPr id="21" name="Straight Arrow Connector 20"/>
-          <p:cNvCxnSpPr/>
-          <p:nvPr/>
-        </p:nvCxnSpPr>
-        <p:spPr>
-          <a:xfrm flipV="1">
-            <a:off x="4901184" y="2002536"/>
-            <a:ext cx="530352" cy="3575304"/>
-          </a:xfrm>
-          <a:prstGeom prst="straightConnector1">
-            <a:avLst/>
-          </a:prstGeom>
-          <a:ln w="38100">
-            <a:solidFill>
-              <a:schemeClr val="tx1"/>
-            </a:solidFill>
-            <a:tailEnd type="arrow"/>
-          </a:ln>
-        </p:spPr>
-        <p:style>
-          <a:lnRef idx="1">
-            <a:schemeClr val="accent1"/>
-          </a:lnRef>
-          <a:fillRef idx="0">
-            <a:schemeClr val="accent1"/>
-          </a:fillRef>
-          <a:effectRef idx="0">
-            <a:schemeClr val="accent1"/>
-          </a:effectRef>
-          <a:fontRef idx="minor">
-            <a:schemeClr val="tx1"/>
-          </a:fontRef>
-        </p:style>
-      </p:cxnSp>
-      <p:cxnSp>
-        <p:nvCxnSpPr>
-          <p:cNvPr id="23" name="Straight Arrow Connector 22"/>
-          <p:cNvCxnSpPr/>
-          <p:nvPr/>
-        </p:nvCxnSpPr>
-        <p:spPr>
-          <a:xfrm flipV="1">
-            <a:off x="4901184" y="585216"/>
-            <a:ext cx="2395728" cy="4992624"/>
-          </a:xfrm>
-          <a:prstGeom prst="straightConnector1">
-            <a:avLst/>
-          </a:prstGeom>
-          <a:ln w="38100">
-            <a:solidFill>
-              <a:schemeClr val="tx1"/>
-            </a:solidFill>
-            <a:tailEnd type="arrow"/>
-          </a:ln>
-        </p:spPr>
-        <p:style>
-          <a:lnRef idx="1">
-            <a:schemeClr val="accent1"/>
-          </a:lnRef>
-          <a:fillRef idx="0">
-            <a:schemeClr val="accent1"/>
-          </a:fillRef>
-          <a:effectRef idx="0">
-            <a:schemeClr val="accent1"/>
-          </a:effectRef>
-          <a:fontRef idx="minor">
-            <a:schemeClr val="tx1"/>
-          </a:fontRef>
-        </p:style>
-      </p:cxnSp>
-      <p:cxnSp>
-        <p:nvCxnSpPr>
-          <p:cNvPr id="25" name="Straight Arrow Connector 24"/>
-          <p:cNvCxnSpPr/>
-          <p:nvPr/>
-        </p:nvCxnSpPr>
-        <p:spPr>
-          <a:xfrm flipV="1">
-            <a:off x="4901184" y="3419856"/>
-            <a:ext cx="4370832" cy="2157984"/>
-          </a:xfrm>
-          <a:prstGeom prst="straightConnector1">
-            <a:avLst/>
-          </a:prstGeom>
-          <a:ln w="38100">
-            <a:solidFill>
-              <a:schemeClr val="tx1"/>
-            </a:solidFill>
-            <a:tailEnd type="arrow"/>
-          </a:ln>
-        </p:spPr>
-        <p:style>
-          <a:lnRef idx="1">
-            <a:schemeClr val="accent1"/>
-          </a:lnRef>
-          <a:fillRef idx="0">
-            <a:schemeClr val="accent1"/>
-          </a:fillRef>
-          <a:effectRef idx="0">
-            <a:schemeClr val="accent1"/>
-          </a:effectRef>
-          <a:fontRef idx="minor">
-            <a:schemeClr val="tx1"/>
-          </a:fontRef>
-        </p:style>
-      </p:cxnSp>
-      <p:sp>
-        <p:nvSpPr>
-          <p:cNvPr id="26" name="Oval 25"/>
-          <p:cNvSpPr/>
-          <p:nvPr/>
-        </p:nvSpPr>
-        <p:spPr>
-          <a:xfrm>
-            <a:off x="4828032" y="5431536"/>
-            <a:ext cx="182880" cy="182880"/>
-          </a:xfrm>
-          <a:prstGeom prst="ellipse">
-            <a:avLst/>
-          </a:prstGeom>
-          <a:solidFill>
-            <a:schemeClr val="tx1"/>
-          </a:solidFill>
-          <a:ln>
-            <a:solidFill>
-              <a:schemeClr val="tx1"/>
-            </a:solidFill>
-          </a:ln>
-        </p:spPr>
-        <p:style>
-          <a:lnRef idx="2">
-            <a:schemeClr val="accent1">
-              <a:shade val="50000"/>
-            </a:schemeClr>
-          </a:lnRef>
-          <a:fillRef idx="1">
-            <a:schemeClr val="accent1"/>
-          </a:fillRef>
-          <a:effectRef idx="0">
-            <a:schemeClr val="accent1"/>
-          </a:effectRef>
-          <a:fontRef idx="minor">
-            <a:schemeClr val="lt1"/>
-          </a:fontRef>
-        </p:style>
-        <p:txBody>
-          <a:bodyPr rtlCol="0" anchor="ctr"/>
-          <a:lstStyle/>
-          <a:p>
-            <a:pPr algn="ctr"/>
-            <a:endParaRPr lang="en-US"/>
-          </a:p>
-        </p:txBody>
-      </p:sp>
-      <p:sp>
-        <p:nvSpPr>
-          <p:cNvPr id="27" name="TextBox 26"/>
-          <p:cNvSpPr txBox="1"/>
-          <p:nvPr/>
-        </p:nvSpPr>
-        <p:spPr>
-          <a:xfrm>
-            <a:off x="4611466" y="3050524"/>
-            <a:ext cx="433132" cy="369332"/>
-          </a:xfrm>
-          <a:prstGeom prst="rect">
-            <a:avLst/>
-          </a:prstGeom>
-          <a:noFill/>
-        </p:spPr>
-        <p:txBody>
-          <a:bodyPr wrap="none" rtlCol="0">
-            <a:spAutoFit/>
-          </a:bodyPr>
-          <a:lstStyle/>
-          <a:p>
-            <a:r>
-              <a:rPr lang="en-US" dirty="0" smtClean="0"/>
-              <a:t>V1</a:t>
-            </a:r>
-            <a:endParaRPr lang="en-US" dirty="0"/>
-          </a:p>
-        </p:txBody>
-      </p:sp>
-      <p:sp>
-        <p:nvSpPr>
-          <p:cNvPr id="28" name="TextBox 27"/>
-          <p:cNvSpPr txBox="1"/>
-          <p:nvPr/>
-        </p:nvSpPr>
-        <p:spPr>
-          <a:xfrm>
-            <a:off x="6845492" y="1633204"/>
-            <a:ext cx="433132" cy="369332"/>
-          </a:xfrm>
-          <a:prstGeom prst="rect">
-            <a:avLst/>
-          </a:prstGeom>
-          <a:noFill/>
-        </p:spPr>
-        <p:txBody>
-          <a:bodyPr wrap="none" rtlCol="0">
-            <a:spAutoFit/>
-          </a:bodyPr>
-          <a:lstStyle/>
-          <a:p>
-            <a:r>
-              <a:rPr lang="en-US" dirty="0" smtClean="0"/>
-              <a:t>V2</a:t>
-            </a:r>
-            <a:endParaRPr lang="en-US" dirty="0"/>
-          </a:p>
-        </p:txBody>
-      </p:sp>
-      <p:sp>
-        <p:nvSpPr>
-          <p:cNvPr id="29" name="TextBox 28"/>
-          <p:cNvSpPr txBox="1"/>
-          <p:nvPr/>
-        </p:nvSpPr>
-        <p:spPr>
-          <a:xfrm>
-            <a:off x="8665306" y="3941278"/>
-            <a:ext cx="433132" cy="369332"/>
-          </a:xfrm>
-          <a:prstGeom prst="rect">
-            <a:avLst/>
-          </a:prstGeom>
-          <a:noFill/>
-        </p:spPr>
-        <p:txBody>
-          <a:bodyPr wrap="none" rtlCol="0">
-            <a:spAutoFit/>
-          </a:bodyPr>
-          <a:lstStyle/>
-          <a:p>
-            <a:r>
-              <a:rPr lang="en-US" dirty="0" smtClean="0"/>
-              <a:t>V3</a:t>
-            </a:r>
-            <a:endParaRPr lang="en-US" dirty="0"/>
-          </a:p>
-        </p:txBody>
-      </p:sp>
-    </p:spTree>
-    <p:extLst>
-      <p:ext uri="{BB962C8B-B14F-4D97-AF65-F5344CB8AC3E}">
-        <p14:creationId xmlns:p14="http://schemas.microsoft.com/office/powerpoint/2010/main" val="1135426529"/>
       </p:ext>
     </p:extLst>
   </p:cSld>
@@ -3958,7 +3569,7 @@
   <a:extraClrSchemeLst/>
   <a:extLst>
     <a:ext uri="{05A4C25C-085E-4340-85A3-A5531E510DB2}">
-      <thm15:themeFamily xmlns:thm15="http://schemas.microsoft.com/office/thememl/2012/main" xmlns="" name="Office Theme" id="{62F939B6-93AF-4DB8-9C6B-D6C7DFDC589F}" vid="{4A3C46E8-61CC-4603-A589-7422A47A8E4A}"/>
+      <thm15:themeFamily xmlns="" xmlns:thm15="http://schemas.microsoft.com/office/thememl/2012/main" name="Office Theme" id="{62F939B6-93AF-4DB8-9C6B-D6C7DFDC589F}" vid="{4A3C46E8-61CC-4603-A589-7422A47A8E4A}"/>
     </a:ext>
   </a:extLst>
 </a:theme>

</xml_diff>